<commit_message>
FDR and padj value scripts added from Arjun
</commit_message>
<xml_diff>
--- a/RNA-Seq compared to Proteomics.pptx
+++ b/RNA-Seq compared to Proteomics.pptx
@@ -107,6 +107,11 @@
       </a:defRPr>
     </a:lvl9pPr>
   </p:defaultTextStyle>
+  <p:extLst>
+    <p:ext uri="{EFAFB233-063F-42B5-8137-9DF3F51BA10A}">
+      <p15:sldGuideLst xmlns:p15="http://schemas.microsoft.com/office/powerpoint/2012/main"/>
+    </p:ext>
+  </p:extLst>
 </p:presentation>
 </file>
 
@@ -241,7 +246,7 @@
           <a:p>
             <a:fld id="{4974622D-217D-451B-94BA-F7B68F523137}" type="datetimeFigureOut">
               <a:rPr lang="en-CA" smtClean="0"/>
-              <a:t>2019-10-22</a:t>
+              <a:t>2019-10-23</a:t>
             </a:fld>
             <a:endParaRPr lang="en-CA"/>
           </a:p>
@@ -411,7 +416,7 @@
           <a:p>
             <a:fld id="{4974622D-217D-451B-94BA-F7B68F523137}" type="datetimeFigureOut">
               <a:rPr lang="en-CA" smtClean="0"/>
-              <a:t>2019-10-22</a:t>
+              <a:t>2019-10-23</a:t>
             </a:fld>
             <a:endParaRPr lang="en-CA"/>
           </a:p>
@@ -591,7 +596,7 @@
           <a:p>
             <a:fld id="{4974622D-217D-451B-94BA-F7B68F523137}" type="datetimeFigureOut">
               <a:rPr lang="en-CA" smtClean="0"/>
-              <a:t>2019-10-22</a:t>
+              <a:t>2019-10-23</a:t>
             </a:fld>
             <a:endParaRPr lang="en-CA"/>
           </a:p>
@@ -761,7 +766,7 @@
           <a:p>
             <a:fld id="{4974622D-217D-451B-94BA-F7B68F523137}" type="datetimeFigureOut">
               <a:rPr lang="en-CA" smtClean="0"/>
-              <a:t>2019-10-22</a:t>
+              <a:t>2019-10-23</a:t>
             </a:fld>
             <a:endParaRPr lang="en-CA"/>
           </a:p>
@@ -1007,7 +1012,7 @@
           <a:p>
             <a:fld id="{4974622D-217D-451B-94BA-F7B68F523137}" type="datetimeFigureOut">
               <a:rPr lang="en-CA" smtClean="0"/>
-              <a:t>2019-10-22</a:t>
+              <a:t>2019-10-23</a:t>
             </a:fld>
             <a:endParaRPr lang="en-CA"/>
           </a:p>
@@ -1239,7 +1244,7 @@
           <a:p>
             <a:fld id="{4974622D-217D-451B-94BA-F7B68F523137}" type="datetimeFigureOut">
               <a:rPr lang="en-CA" smtClean="0"/>
-              <a:t>2019-10-22</a:t>
+              <a:t>2019-10-23</a:t>
             </a:fld>
             <a:endParaRPr lang="en-CA"/>
           </a:p>
@@ -1606,7 +1611,7 @@
           <a:p>
             <a:fld id="{4974622D-217D-451B-94BA-F7B68F523137}" type="datetimeFigureOut">
               <a:rPr lang="en-CA" smtClean="0"/>
-              <a:t>2019-10-22</a:t>
+              <a:t>2019-10-23</a:t>
             </a:fld>
             <a:endParaRPr lang="en-CA"/>
           </a:p>
@@ -1724,7 +1729,7 @@
           <a:p>
             <a:fld id="{4974622D-217D-451B-94BA-F7B68F523137}" type="datetimeFigureOut">
               <a:rPr lang="en-CA" smtClean="0"/>
-              <a:t>2019-10-22</a:t>
+              <a:t>2019-10-23</a:t>
             </a:fld>
             <a:endParaRPr lang="en-CA"/>
           </a:p>
@@ -1819,7 +1824,7 @@
           <a:p>
             <a:fld id="{4974622D-217D-451B-94BA-F7B68F523137}" type="datetimeFigureOut">
               <a:rPr lang="en-CA" smtClean="0"/>
-              <a:t>2019-10-22</a:t>
+              <a:t>2019-10-23</a:t>
             </a:fld>
             <a:endParaRPr lang="en-CA"/>
           </a:p>
@@ -2096,7 +2101,7 @@
           <a:p>
             <a:fld id="{4974622D-217D-451B-94BA-F7B68F523137}" type="datetimeFigureOut">
               <a:rPr lang="en-CA" smtClean="0"/>
-              <a:t>2019-10-22</a:t>
+              <a:t>2019-10-23</a:t>
             </a:fld>
             <a:endParaRPr lang="en-CA"/>
           </a:p>
@@ -2349,7 +2354,7 @@
           <a:p>
             <a:fld id="{4974622D-217D-451B-94BA-F7B68F523137}" type="datetimeFigureOut">
               <a:rPr lang="en-CA" smtClean="0"/>
-              <a:t>2019-10-22</a:t>
+              <a:t>2019-10-23</a:t>
             </a:fld>
             <a:endParaRPr lang="en-CA"/>
           </a:p>
@@ -2562,7 +2567,7 @@
           <a:p>
             <a:fld id="{4974622D-217D-451B-94BA-F7B68F523137}" type="datetimeFigureOut">
               <a:rPr lang="en-CA" smtClean="0"/>
-              <a:t>2019-10-22</a:t>
+              <a:t>2019-10-23</a:t>
             </a:fld>
             <a:endParaRPr lang="en-CA"/>
           </a:p>

</xml_diff>